<commit_message>
Notes for normalization and lessons learned were added.
</commit_message>
<xml_diff>
--- a/presentation/analyticus_Influenza_vs._vaccinations.pptx
+++ b/presentation/analyticus_Influenza_vs._vaccinations.pptx
@@ -232,7 +232,7 @@
           <a:p>
             <a:fld id="{43EFFB48-1042-473B-808E-23A5C5FAEE77}" type="datetimeFigureOut">
               <a:rPr lang="en-US" smtClean="0"/>
-              <a:t>4/2/18</a:t>
+              <a:t>4/2/2018</a:t>
             </a:fld>
             <a:endParaRPr lang="en-US" dirty="0"/>
           </a:p>
@@ -543,11 +543,7 @@
           <a:bodyPr/>
           <a:lstStyle/>
           <a:p>
-            <a:pPr marL="0" indent="0">
-              <a:buFont typeface="Arial" panose="020B0604020202020204" pitchFamily="34" charset="0"/>
-              <a:buNone/>
-            </a:pPr>
-            <a:endParaRPr lang="en-US" dirty="0"/>
+            <a:endParaRPr lang="en-US"/>
           </a:p>
         </p:txBody>
       </p:sp>
@@ -568,7 +564,7 @@
           <a:p>
             <a:fld id="{5974CB7E-A0D7-4E08-8BDF-ED524DDFD5CC}" type="slidenum">
               <a:rPr lang="en-US" smtClean="0"/>
-              <a:t>6</a:t>
+              <a:t>1</a:t>
             </a:fld>
             <a:endParaRPr lang="en-US" dirty="0"/>
           </a:p>
@@ -577,7 +573,304 @@
     </p:spTree>
     <p:extLst>
       <p:ext uri="{BB962C8B-B14F-4D97-AF65-F5344CB8AC3E}">
-        <p14:creationId xmlns:p14="http://schemas.microsoft.com/office/powerpoint/2010/main" val="2853069777"/>
+        <p14:creationId xmlns:p14="http://schemas.microsoft.com/office/powerpoint/2010/main" val="795564994"/>
+      </p:ext>
+    </p:extLst>
+  </p:cSld>
+  <p:clrMapOvr>
+    <a:masterClrMapping/>
+  </p:clrMapOvr>
+</p:notes>
+</file>
+
+<file path=ppt/notesSlides/notesSlide10.xml><?xml version="1.0" encoding="utf-8"?>
+<p:notes xmlns:a="http://schemas.openxmlformats.org/drawingml/2006/main" xmlns:r="http://schemas.openxmlformats.org/officeDocument/2006/relationships" xmlns:p="http://schemas.openxmlformats.org/presentationml/2006/main">
+  <p:cSld>
+    <p:spTree>
+      <p:nvGrpSpPr>
+        <p:cNvPr id="1" name=""/>
+        <p:cNvGrpSpPr/>
+        <p:nvPr/>
+      </p:nvGrpSpPr>
+      <p:grpSpPr>
+        <a:xfrm>
+          <a:off x="0" y="0"/>
+          <a:ext cx="0" cy="0"/>
+          <a:chOff x="0" y="0"/>
+          <a:chExt cx="0" cy="0"/>
+        </a:xfrm>
+      </p:grpSpPr>
+      <p:sp>
+        <p:nvSpPr>
+          <p:cNvPr id="2" name="Slide Image Placeholder 1"/>
+          <p:cNvSpPr>
+            <a:spLocks noGrp="1" noRot="1" noChangeAspect="1"/>
+          </p:cNvSpPr>
+          <p:nvPr>
+            <p:ph type="sldImg"/>
+          </p:nvPr>
+        </p:nvSpPr>
+        <p:spPr/>
+      </p:sp>
+      <p:sp>
+        <p:nvSpPr>
+          <p:cNvPr id="3" name="Notes Placeholder 2"/>
+          <p:cNvSpPr>
+            <a:spLocks noGrp="1"/>
+          </p:cNvSpPr>
+          <p:nvPr>
+            <p:ph type="body" idx="1"/>
+          </p:nvPr>
+        </p:nvSpPr>
+        <p:spPr/>
+        <p:txBody>
+          <a:bodyPr/>
+          <a:lstStyle/>
+          <a:p>
+            <a:r>
+              <a:rPr lang="en-US" dirty="0"/>
+              <a:t>2013-2014 date support the hypothesis in previous slide, higher the vaccination rate, lower the flu rate.</a:t>
+            </a:r>
+          </a:p>
+          <a:p>
+            <a:endParaRPr lang="en-US" dirty="0"/>
+          </a:p>
+          <a:p>
+            <a:r>
+              <a:rPr lang="en-US" dirty="0"/>
+              <a:t>There also outliers in both years cases. For example, Virginia.</a:t>
+            </a:r>
+          </a:p>
+          <a:p>
+            <a:endParaRPr lang="en-US" dirty="0"/>
+          </a:p>
+          <a:p>
+            <a:r>
+              <a:rPr lang="en-US" dirty="0"/>
+              <a:t>Possible reason: humidity, temperature</a:t>
+            </a:r>
+          </a:p>
+          <a:p>
+            <a:endParaRPr lang="en-US" dirty="0"/>
+          </a:p>
+        </p:txBody>
+      </p:sp>
+      <p:sp>
+        <p:nvSpPr>
+          <p:cNvPr id="4" name="Slide Number Placeholder 3"/>
+          <p:cNvSpPr>
+            <a:spLocks noGrp="1"/>
+          </p:cNvSpPr>
+          <p:nvPr>
+            <p:ph type="sldNum" sz="quarter" idx="10"/>
+          </p:nvPr>
+        </p:nvSpPr>
+        <p:spPr/>
+        <p:txBody>
+          <a:bodyPr/>
+          <a:lstStyle/>
+          <a:p>
+            <a:fld id="{5974CB7E-A0D7-4E08-8BDF-ED524DDFD5CC}" type="slidenum">
+              <a:rPr lang="en-US" smtClean="0"/>
+              <a:t>10</a:t>
+            </a:fld>
+            <a:endParaRPr lang="en-US" dirty="0"/>
+          </a:p>
+        </p:txBody>
+      </p:sp>
+    </p:spTree>
+    <p:extLst>
+      <p:ext uri="{BB962C8B-B14F-4D97-AF65-F5344CB8AC3E}">
+        <p14:creationId xmlns:p14="http://schemas.microsoft.com/office/powerpoint/2010/main" val="2660483837"/>
+      </p:ext>
+    </p:extLst>
+  </p:cSld>
+  <p:clrMapOvr>
+    <a:masterClrMapping/>
+  </p:clrMapOvr>
+</p:notes>
+</file>
+
+<file path=ppt/notesSlides/notesSlide11.xml><?xml version="1.0" encoding="utf-8"?>
+<p:notes xmlns:a="http://schemas.openxmlformats.org/drawingml/2006/main" xmlns:r="http://schemas.openxmlformats.org/officeDocument/2006/relationships" xmlns:p="http://schemas.openxmlformats.org/presentationml/2006/main">
+  <p:cSld>
+    <p:spTree>
+      <p:nvGrpSpPr>
+        <p:cNvPr id="1" name=""/>
+        <p:cNvGrpSpPr/>
+        <p:nvPr/>
+      </p:nvGrpSpPr>
+      <p:grpSpPr>
+        <a:xfrm>
+          <a:off x="0" y="0"/>
+          <a:ext cx="0" cy="0"/>
+          <a:chOff x="0" y="0"/>
+          <a:chExt cx="0" cy="0"/>
+        </a:xfrm>
+      </p:grpSpPr>
+      <p:sp>
+        <p:nvSpPr>
+          <p:cNvPr id="2" name="Slide Image Placeholder 1"/>
+          <p:cNvSpPr>
+            <a:spLocks noGrp="1" noRot="1" noChangeAspect="1"/>
+          </p:cNvSpPr>
+          <p:nvPr>
+            <p:ph type="sldImg"/>
+          </p:nvPr>
+        </p:nvSpPr>
+        <p:spPr/>
+      </p:sp>
+      <p:sp>
+        <p:nvSpPr>
+          <p:cNvPr id="3" name="Notes Placeholder 2"/>
+          <p:cNvSpPr>
+            <a:spLocks noGrp="1"/>
+          </p:cNvSpPr>
+          <p:nvPr>
+            <p:ph type="body" idx="1"/>
+          </p:nvPr>
+        </p:nvSpPr>
+        <p:spPr/>
+        <p:txBody>
+          <a:bodyPr/>
+          <a:lstStyle/>
+          <a:p>
+            <a:r>
+              <a:rPr lang="en-US" dirty="0"/>
+              <a:t>2017-2018 season has becoming an extremely serious flu-spreading year.</a:t>
+            </a:r>
+          </a:p>
+          <a:p>
+            <a:endParaRPr lang="en-US" dirty="0"/>
+          </a:p>
+          <a:p>
+            <a:r>
+              <a:rPr lang="en-US" dirty="0"/>
+              <a:t>States that used to have high rate of influenza this years had a significant increase on number of reported cases.</a:t>
+            </a:r>
+          </a:p>
+          <a:p>
+            <a:endParaRPr lang="en-US" dirty="0"/>
+          </a:p>
+          <a:p>
+            <a:r>
+              <a:rPr lang="en-US" dirty="0"/>
+              <a:t>Louisiana, Virginia, Alabama</a:t>
+            </a:r>
+          </a:p>
+        </p:txBody>
+      </p:sp>
+      <p:sp>
+        <p:nvSpPr>
+          <p:cNvPr id="4" name="Slide Number Placeholder 3"/>
+          <p:cNvSpPr>
+            <a:spLocks noGrp="1"/>
+          </p:cNvSpPr>
+          <p:nvPr>
+            <p:ph type="sldNum" sz="quarter" idx="10"/>
+          </p:nvPr>
+        </p:nvSpPr>
+        <p:spPr/>
+        <p:txBody>
+          <a:bodyPr/>
+          <a:lstStyle/>
+          <a:p>
+            <a:fld id="{5974CB7E-A0D7-4E08-8BDF-ED524DDFD5CC}" type="slidenum">
+              <a:rPr lang="en-US" smtClean="0"/>
+              <a:t>11</a:t>
+            </a:fld>
+            <a:endParaRPr lang="en-US" dirty="0"/>
+          </a:p>
+        </p:txBody>
+      </p:sp>
+    </p:spTree>
+    <p:extLst>
+      <p:ext uri="{BB962C8B-B14F-4D97-AF65-F5344CB8AC3E}">
+        <p14:creationId xmlns:p14="http://schemas.microsoft.com/office/powerpoint/2010/main" val="2618271329"/>
+      </p:ext>
+    </p:extLst>
+  </p:cSld>
+  <p:clrMapOvr>
+    <a:masterClrMapping/>
+  </p:clrMapOvr>
+</p:notes>
+</file>
+
+<file path=ppt/notesSlides/notesSlide12.xml><?xml version="1.0" encoding="utf-8"?>
+<p:notes xmlns:a="http://schemas.openxmlformats.org/drawingml/2006/main" xmlns:r="http://schemas.openxmlformats.org/officeDocument/2006/relationships" xmlns:p="http://schemas.openxmlformats.org/presentationml/2006/main">
+  <p:cSld>
+    <p:spTree>
+      <p:nvGrpSpPr>
+        <p:cNvPr id="1" name=""/>
+        <p:cNvGrpSpPr/>
+        <p:nvPr/>
+      </p:nvGrpSpPr>
+      <p:grpSpPr>
+        <a:xfrm>
+          <a:off x="0" y="0"/>
+          <a:ext cx="0" cy="0"/>
+          <a:chOff x="0" y="0"/>
+          <a:chExt cx="0" cy="0"/>
+        </a:xfrm>
+      </p:grpSpPr>
+      <p:sp>
+        <p:nvSpPr>
+          <p:cNvPr id="2" name="Slide Image Placeholder 1"/>
+          <p:cNvSpPr>
+            <a:spLocks noGrp="1" noRot="1" noChangeAspect="1"/>
+          </p:cNvSpPr>
+          <p:nvPr>
+            <p:ph type="sldImg"/>
+          </p:nvPr>
+        </p:nvSpPr>
+        <p:spPr/>
+      </p:sp>
+      <p:sp>
+        <p:nvSpPr>
+          <p:cNvPr id="3" name="Notes Placeholder 2"/>
+          <p:cNvSpPr>
+            <a:spLocks noGrp="1"/>
+          </p:cNvSpPr>
+          <p:nvPr>
+            <p:ph type="body" idx="1"/>
+          </p:nvPr>
+        </p:nvSpPr>
+        <p:spPr/>
+        <p:txBody>
+          <a:bodyPr/>
+          <a:lstStyle/>
+          <a:p>
+            <a:endParaRPr lang="en-US"/>
+          </a:p>
+        </p:txBody>
+      </p:sp>
+      <p:sp>
+        <p:nvSpPr>
+          <p:cNvPr id="4" name="Slide Number Placeholder 3"/>
+          <p:cNvSpPr>
+            <a:spLocks noGrp="1"/>
+          </p:cNvSpPr>
+          <p:nvPr>
+            <p:ph type="sldNum" sz="quarter" idx="10"/>
+          </p:nvPr>
+        </p:nvSpPr>
+        <p:spPr/>
+        <p:txBody>
+          <a:bodyPr/>
+          <a:lstStyle/>
+          <a:p>
+            <a:fld id="{5974CB7E-A0D7-4E08-8BDF-ED524DDFD5CC}" type="slidenum">
+              <a:rPr lang="en-US" smtClean="0"/>
+              <a:t>12</a:t>
+            </a:fld>
+            <a:endParaRPr lang="en-US" dirty="0"/>
+          </a:p>
+        </p:txBody>
+      </p:sp>
+    </p:spTree>
+    <p:extLst>
+      <p:ext uri="{BB962C8B-B14F-4D97-AF65-F5344CB8AC3E}">
+        <p14:creationId xmlns:p14="http://schemas.microsoft.com/office/powerpoint/2010/main" val="1731079821"/>
       </p:ext>
     </p:extLst>
   </p:cSld>
@@ -631,111 +924,7 @@
           <a:bodyPr/>
           <a:lstStyle/>
           <a:p>
-            <a:pPr marL="0" indent="0">
-              <a:buFont typeface="Arial" panose="020B0604020202020204" pitchFamily="34" charset="0"/>
-              <a:buNone/>
-            </a:pPr>
-            <a:r>
-              <a:rPr lang="en-US" altLang="zh-Hans" dirty="0"/>
-              <a:t>Why</a:t>
-            </a:r>
-            <a:r>
-              <a:rPr lang="zh-Hans" altLang="en-US"/>
-              <a:t> </a:t>
-            </a:r>
-            <a:r>
-              <a:rPr lang="en-US" altLang="zh-Hans" dirty="0"/>
-              <a:t>2015?</a:t>
-            </a:r>
-            <a:r>
-              <a:rPr lang="zh-Hans" altLang="en-US"/>
-              <a:t> </a:t>
-            </a:r>
-            <a:r>
-              <a:rPr lang="en-US" altLang="zh-Hans" dirty="0"/>
-              <a:t>Because</a:t>
-            </a:r>
-            <a:r>
-              <a:rPr lang="zh-Hans" altLang="en-US"/>
-              <a:t> </a:t>
-            </a:r>
-            <a:r>
-              <a:rPr lang="en-US" altLang="zh-Hans" dirty="0"/>
-              <a:t>2015</a:t>
-            </a:r>
-            <a:r>
-              <a:rPr lang="zh-Hans" altLang="en-US"/>
-              <a:t> </a:t>
-            </a:r>
-            <a:r>
-              <a:rPr lang="en-US" altLang="zh-Hans" dirty="0"/>
-              <a:t>has</a:t>
-            </a:r>
-            <a:r>
-              <a:rPr lang="zh-Hans" altLang="en-US"/>
-              <a:t> </a:t>
-            </a:r>
-            <a:r>
-              <a:rPr lang="en-US" altLang="zh-Hans" dirty="0"/>
-              <a:t>the</a:t>
-            </a:r>
-            <a:r>
-              <a:rPr lang="zh-Hans" altLang="en-US"/>
-              <a:t> </a:t>
-            </a:r>
-            <a:r>
-              <a:rPr lang="en-US" altLang="zh-Hans" dirty="0"/>
-              <a:t>lowest</a:t>
-            </a:r>
-            <a:r>
-              <a:rPr lang="zh-Hans" altLang="en-US"/>
-              <a:t> </a:t>
-            </a:r>
-            <a:r>
-              <a:rPr lang="en-US" altLang="zh-Hans" dirty="0"/>
-              <a:t>flu</a:t>
-            </a:r>
-            <a:r>
-              <a:rPr lang="zh-Hans" altLang="en-US"/>
-              <a:t> </a:t>
-            </a:r>
-            <a:r>
-              <a:rPr lang="en-US" altLang="zh-Hans" dirty="0"/>
-              <a:t>cases</a:t>
-            </a:r>
-            <a:r>
-              <a:rPr lang="zh-Hans" altLang="en-US"/>
-              <a:t> </a:t>
-            </a:r>
-            <a:r>
-              <a:rPr lang="en-US" altLang="zh-Hans" dirty="0"/>
-              <a:t>in</a:t>
-            </a:r>
-            <a:r>
-              <a:rPr lang="zh-Hans" altLang="en-US"/>
-              <a:t> </a:t>
-            </a:r>
-            <a:r>
-              <a:rPr lang="en-US" altLang="zh-Hans" dirty="0"/>
-              <a:t>past</a:t>
-            </a:r>
-            <a:r>
-              <a:rPr lang="zh-Hans" altLang="en-US"/>
-              <a:t> </a:t>
-            </a:r>
-            <a:r>
-              <a:rPr lang="en-US" altLang="zh-Hans" dirty="0"/>
-              <a:t>5</a:t>
-            </a:r>
-            <a:r>
-              <a:rPr lang="zh-Hans" altLang="en-US"/>
-              <a:t> </a:t>
-            </a:r>
-            <a:r>
-              <a:rPr lang="en-US" altLang="zh-Hans" dirty="0"/>
-              <a:t>years.</a:t>
-            </a:r>
-            <a:endParaRPr lang="en-US" dirty="0"/>
+            <a:endParaRPr lang="en-US"/>
           </a:p>
         </p:txBody>
       </p:sp>
@@ -756,7 +945,7 @@
           <a:p>
             <a:fld id="{5974CB7E-A0D7-4E08-8BDF-ED524DDFD5CC}" type="slidenum">
               <a:rPr lang="en-US" smtClean="0"/>
-              <a:t>8</a:t>
+              <a:t>2</a:t>
             </a:fld>
             <a:endParaRPr lang="en-US" dirty="0"/>
           </a:p>
@@ -765,7 +954,7 @@
     </p:spTree>
     <p:extLst>
       <p:ext uri="{BB962C8B-B14F-4D97-AF65-F5344CB8AC3E}">
-        <p14:creationId xmlns:p14="http://schemas.microsoft.com/office/powerpoint/2010/main" val="3216539580"/>
+        <p14:creationId xmlns:p14="http://schemas.microsoft.com/office/powerpoint/2010/main" val="3131267465"/>
       </p:ext>
     </p:extLst>
   </p:cSld>
@@ -819,70 +1008,7 @@
           <a:bodyPr/>
           <a:lstStyle/>
           <a:p>
-            <a:r>
-              <a:rPr lang="en-US" dirty="0"/>
-              <a:t>Initial proposal: higher vaccination rate will lead to lower influenza rate.</a:t>
-            </a:r>
-          </a:p>
-          <a:p>
-            <a:endParaRPr lang="en-US" dirty="0"/>
-          </a:p>
-          <a:p>
-            <a:r>
-              <a:rPr lang="en-US" dirty="0"/>
-              <a:t>Result: generally true in most of the 50 states (can tell by color):</a:t>
-            </a:r>
-          </a:p>
-          <a:p>
-            <a:pPr marL="171450" indent="-171450">
-              <a:buFont typeface="Arial" panose="020B0604020202020204" pitchFamily="34" charset="0"/>
-              <a:buChar char="•"/>
-            </a:pPr>
-            <a:r>
-              <a:rPr lang="en-US" dirty="0"/>
-              <a:t>Louisiana, Mississippi, new Mexico: low vaccination rate and high flu rate</a:t>
-            </a:r>
-          </a:p>
-          <a:p>
-            <a:pPr marL="628650" lvl="1" indent="-171450">
-              <a:buFont typeface="Arial" panose="020B0604020202020204" pitchFamily="34" charset="0"/>
-              <a:buChar char="•"/>
-            </a:pPr>
-            <a:r>
-              <a:rPr lang="en-US" dirty="0"/>
-              <a:t>Possible reason: educational level, cultural background leads to different belief.</a:t>
-            </a:r>
-          </a:p>
-          <a:p>
-            <a:pPr marL="171450" indent="-171450">
-              <a:buFont typeface="Arial" panose="020B0604020202020204" pitchFamily="34" charset="0"/>
-              <a:buChar char="•"/>
-            </a:pPr>
-            <a:r>
-              <a:rPr lang="en-US" dirty="0"/>
-              <a:t>Wisconsin, Iowa, Minnesota: high vaccination rate and low flu rate</a:t>
-            </a:r>
-          </a:p>
-          <a:p>
-            <a:pPr marL="0" indent="0">
-              <a:buFont typeface="Arial" panose="020B0604020202020204" pitchFamily="34" charset="0"/>
-              <a:buNone/>
-            </a:pPr>
-            <a:endParaRPr lang="en-US" dirty="0"/>
-          </a:p>
-          <a:p>
-            <a:pPr marL="0" indent="0">
-              <a:buFont typeface="Arial" panose="020B0604020202020204" pitchFamily="34" charset="0"/>
-              <a:buNone/>
-            </a:pPr>
-            <a:endParaRPr lang="en-US" dirty="0"/>
-          </a:p>
-          <a:p>
-            <a:pPr marL="0" indent="0">
-              <a:buFont typeface="Arial" panose="020B0604020202020204" pitchFamily="34" charset="0"/>
-              <a:buNone/>
-            </a:pPr>
-            <a:endParaRPr lang="en-US" dirty="0"/>
+            <a:endParaRPr lang="en-US"/>
           </a:p>
         </p:txBody>
       </p:sp>
@@ -903,7 +1029,7 @@
           <a:p>
             <a:fld id="{5974CB7E-A0D7-4E08-8BDF-ED524DDFD5CC}" type="slidenum">
               <a:rPr lang="en-US" smtClean="0"/>
-              <a:t>9</a:t>
+              <a:t>3</a:t>
             </a:fld>
             <a:endParaRPr lang="en-US" dirty="0"/>
           </a:p>
@@ -912,7 +1038,7 @@
     </p:spTree>
     <p:extLst>
       <p:ext uri="{BB962C8B-B14F-4D97-AF65-F5344CB8AC3E}">
-        <p14:creationId xmlns:p14="http://schemas.microsoft.com/office/powerpoint/2010/main" val="3071717373"/>
+        <p14:creationId xmlns:p14="http://schemas.microsoft.com/office/powerpoint/2010/main" val="597690859"/>
       </p:ext>
     </p:extLst>
   </p:cSld>
@@ -968,7 +1094,7 @@
           <a:p>
             <a:r>
               <a:rPr lang="en-US" dirty="0"/>
-              <a:t>2013-2014 date support the hypothesis in previous slide, higher the vaccination rate, lower the flu rate.</a:t>
+              <a:t>The Center for Disease Control (CDC) and the Department of Health and Human Resources (HHS) are both government agencies.  However, they use vastly different time periods for tracking the influenza season.</a:t>
             </a:r>
           </a:p>
           <a:p>
@@ -977,7 +1103,7 @@
           <a:p>
             <a:r>
               <a:rPr lang="en-US" dirty="0"/>
-              <a:t>There also outliers in both years cases. For example, Virginia.</a:t>
+              <a:t>The CDC tracks cases of influenza-like-illnesses (ILI) starting in October.  Weeks are identified by the week number of the year.  In October, it starts with 40.</a:t>
             </a:r>
           </a:p>
           <a:p>
@@ -986,11 +1112,17 @@
           <a:p>
             <a:r>
               <a:rPr lang="en-US" dirty="0"/>
-              <a:t>Possible reason: humidity, temperature</a:t>
+              <a:t>The HHS tracks influenza vaccinations.  It considers August to be the start of the flu season.  It has a monotonically increasing value for each week.</a:t>
             </a:r>
           </a:p>
           <a:p>
             <a:endParaRPr lang="en-US" dirty="0"/>
+          </a:p>
+          <a:p>
+            <a:r>
+              <a:rPr lang="en-US" dirty="0"/>
+              <a:t>The normalized week number  is the same as the HHS sequence.  This required the conversion of the year and week values of the CDC to be the same as those of the HHS.</a:t>
+            </a:r>
           </a:p>
         </p:txBody>
       </p:sp>
@@ -1011,7 +1143,7 @@
           <a:p>
             <a:fld id="{5974CB7E-A0D7-4E08-8BDF-ED524DDFD5CC}" type="slidenum">
               <a:rPr lang="en-US" smtClean="0"/>
-              <a:t>10</a:t>
+              <a:t>4</a:t>
             </a:fld>
             <a:endParaRPr lang="en-US" dirty="0"/>
           </a:p>
@@ -1020,7 +1152,7 @@
     </p:spTree>
     <p:extLst>
       <p:ext uri="{BB962C8B-B14F-4D97-AF65-F5344CB8AC3E}">
-        <p14:creationId xmlns:p14="http://schemas.microsoft.com/office/powerpoint/2010/main" val="2660483837"/>
+        <p14:creationId xmlns:p14="http://schemas.microsoft.com/office/powerpoint/2010/main" val="3802178800"/>
       </p:ext>
     </p:extLst>
   </p:cSld>
@@ -1076,7 +1208,7 @@
           <a:p>
             <a:r>
               <a:rPr lang="en-US" dirty="0"/>
-              <a:t>2017-2018 season has becoming an extremely serious flu-spreading year.</a:t>
+              <a:t>The data from the CDC  was manually downloaded from a website to a CSV file.  This file was loaded directly into a pandas Dataframe.</a:t>
             </a:r>
           </a:p>
           <a:p>
@@ -1085,7 +1217,7 @@
           <a:p>
             <a:r>
               <a:rPr lang="en-US" dirty="0"/>
-              <a:t>States that used to have high rate of influenza this years had a significant increase on number of reported cases.</a:t>
+              <a:t>The data from the HHS was acquired from an API.  The results of the query was loaded directly into a python dictionary which was  loaded directly into a pandas Dataframe.</a:t>
             </a:r>
           </a:p>
           <a:p>
@@ -1094,7 +1226,15 @@
           <a:p>
             <a:r>
               <a:rPr lang="en-US" dirty="0"/>
-              <a:t>Louisiana, Virginia, Alabama</a:t>
+              <a:t>These </a:t>
+            </a:r>
+            <a:r>
+              <a:rPr lang="en-US" dirty="0" err="1"/>
+              <a:t>DataFrames</a:t>
+            </a:r>
+            <a:r>
+              <a:rPr lang="en-US" dirty="0"/>
+              <a:t> were merged, allowing the creation of plots that compared cases of influenza to rates of vaccination.</a:t>
             </a:r>
           </a:p>
         </p:txBody>
@@ -1116,7 +1256,7 @@
           <a:p>
             <a:fld id="{5974CB7E-A0D7-4E08-8BDF-ED524DDFD5CC}" type="slidenum">
               <a:rPr lang="en-US" smtClean="0"/>
-              <a:t>11</a:t>
+              <a:t>5</a:t>
             </a:fld>
             <a:endParaRPr lang="en-US" dirty="0"/>
           </a:p>
@@ -1125,7 +1265,514 @@
     </p:spTree>
     <p:extLst>
       <p:ext uri="{BB962C8B-B14F-4D97-AF65-F5344CB8AC3E}">
-        <p14:creationId xmlns:p14="http://schemas.microsoft.com/office/powerpoint/2010/main" val="2618271329"/>
+        <p14:creationId xmlns:p14="http://schemas.microsoft.com/office/powerpoint/2010/main" val="2487548517"/>
+      </p:ext>
+    </p:extLst>
+  </p:cSld>
+  <p:clrMapOvr>
+    <a:masterClrMapping/>
+  </p:clrMapOvr>
+</p:notes>
+</file>
+
+<file path=ppt/notesSlides/notesSlide6.xml><?xml version="1.0" encoding="utf-8"?>
+<p:notes xmlns:a="http://schemas.openxmlformats.org/drawingml/2006/main" xmlns:r="http://schemas.openxmlformats.org/officeDocument/2006/relationships" xmlns:p="http://schemas.openxmlformats.org/presentationml/2006/main">
+  <p:cSld>
+    <p:spTree>
+      <p:nvGrpSpPr>
+        <p:cNvPr id="1" name=""/>
+        <p:cNvGrpSpPr/>
+        <p:nvPr/>
+      </p:nvGrpSpPr>
+      <p:grpSpPr>
+        <a:xfrm>
+          <a:off x="0" y="0"/>
+          <a:ext cx="0" cy="0"/>
+          <a:chOff x="0" y="0"/>
+          <a:chExt cx="0" cy="0"/>
+        </a:xfrm>
+      </p:grpSpPr>
+      <p:sp>
+        <p:nvSpPr>
+          <p:cNvPr id="2" name="Slide Image Placeholder 1"/>
+          <p:cNvSpPr>
+            <a:spLocks noGrp="1" noRot="1" noChangeAspect="1"/>
+          </p:cNvSpPr>
+          <p:nvPr>
+            <p:ph type="sldImg"/>
+          </p:nvPr>
+        </p:nvSpPr>
+        <p:spPr/>
+      </p:sp>
+      <p:sp>
+        <p:nvSpPr>
+          <p:cNvPr id="3" name="Notes Placeholder 2"/>
+          <p:cNvSpPr>
+            <a:spLocks noGrp="1"/>
+          </p:cNvSpPr>
+          <p:nvPr>
+            <p:ph type="body" idx="1"/>
+          </p:nvPr>
+        </p:nvSpPr>
+        <p:spPr/>
+        <p:txBody>
+          <a:bodyPr/>
+          <a:lstStyle/>
+          <a:p>
+            <a:pPr marL="0" indent="0">
+              <a:buFont typeface="Arial" panose="020B0604020202020204" pitchFamily="34" charset="0"/>
+              <a:buNone/>
+            </a:pPr>
+            <a:endParaRPr lang="en-US" dirty="0"/>
+          </a:p>
+        </p:txBody>
+      </p:sp>
+      <p:sp>
+        <p:nvSpPr>
+          <p:cNvPr id="4" name="Slide Number Placeholder 3"/>
+          <p:cNvSpPr>
+            <a:spLocks noGrp="1"/>
+          </p:cNvSpPr>
+          <p:nvPr>
+            <p:ph type="sldNum" sz="quarter" idx="10"/>
+          </p:nvPr>
+        </p:nvSpPr>
+        <p:spPr/>
+        <p:txBody>
+          <a:bodyPr/>
+          <a:lstStyle/>
+          <a:p>
+            <a:fld id="{5974CB7E-A0D7-4E08-8BDF-ED524DDFD5CC}" type="slidenum">
+              <a:rPr lang="en-US" smtClean="0"/>
+              <a:t>6</a:t>
+            </a:fld>
+            <a:endParaRPr lang="en-US" dirty="0"/>
+          </a:p>
+        </p:txBody>
+      </p:sp>
+    </p:spTree>
+    <p:extLst>
+      <p:ext uri="{BB962C8B-B14F-4D97-AF65-F5344CB8AC3E}">
+        <p14:creationId xmlns:p14="http://schemas.microsoft.com/office/powerpoint/2010/main" val="2853069777"/>
+      </p:ext>
+    </p:extLst>
+  </p:cSld>
+  <p:clrMapOvr>
+    <a:masterClrMapping/>
+  </p:clrMapOvr>
+</p:notes>
+</file>
+
+<file path=ppt/notesSlides/notesSlide7.xml><?xml version="1.0" encoding="utf-8"?>
+<p:notes xmlns:a="http://schemas.openxmlformats.org/drawingml/2006/main" xmlns:r="http://schemas.openxmlformats.org/officeDocument/2006/relationships" xmlns:p="http://schemas.openxmlformats.org/presentationml/2006/main">
+  <p:cSld>
+    <p:spTree>
+      <p:nvGrpSpPr>
+        <p:cNvPr id="1" name=""/>
+        <p:cNvGrpSpPr/>
+        <p:nvPr/>
+      </p:nvGrpSpPr>
+      <p:grpSpPr>
+        <a:xfrm>
+          <a:off x="0" y="0"/>
+          <a:ext cx="0" cy="0"/>
+          <a:chOff x="0" y="0"/>
+          <a:chExt cx="0" cy="0"/>
+        </a:xfrm>
+      </p:grpSpPr>
+      <p:sp>
+        <p:nvSpPr>
+          <p:cNvPr id="2" name="Slide Image Placeholder 1"/>
+          <p:cNvSpPr>
+            <a:spLocks noGrp="1" noRot="1" noChangeAspect="1"/>
+          </p:cNvSpPr>
+          <p:nvPr>
+            <p:ph type="sldImg"/>
+          </p:nvPr>
+        </p:nvSpPr>
+        <p:spPr/>
+      </p:sp>
+      <p:sp>
+        <p:nvSpPr>
+          <p:cNvPr id="3" name="Notes Placeholder 2"/>
+          <p:cNvSpPr>
+            <a:spLocks noGrp="1"/>
+          </p:cNvSpPr>
+          <p:nvPr>
+            <p:ph type="body" idx="1"/>
+          </p:nvPr>
+        </p:nvSpPr>
+        <p:spPr/>
+        <p:txBody>
+          <a:bodyPr/>
+          <a:lstStyle/>
+          <a:p>
+            <a:endParaRPr lang="en-US"/>
+          </a:p>
+        </p:txBody>
+      </p:sp>
+      <p:sp>
+        <p:nvSpPr>
+          <p:cNvPr id="4" name="Slide Number Placeholder 3"/>
+          <p:cNvSpPr>
+            <a:spLocks noGrp="1"/>
+          </p:cNvSpPr>
+          <p:nvPr>
+            <p:ph type="sldNum" sz="quarter" idx="10"/>
+          </p:nvPr>
+        </p:nvSpPr>
+        <p:spPr/>
+        <p:txBody>
+          <a:bodyPr/>
+          <a:lstStyle/>
+          <a:p>
+            <a:fld id="{5974CB7E-A0D7-4E08-8BDF-ED524DDFD5CC}" type="slidenum">
+              <a:rPr lang="en-US" smtClean="0"/>
+              <a:t>7</a:t>
+            </a:fld>
+            <a:endParaRPr lang="en-US" dirty="0"/>
+          </a:p>
+        </p:txBody>
+      </p:sp>
+    </p:spTree>
+    <p:extLst>
+      <p:ext uri="{BB962C8B-B14F-4D97-AF65-F5344CB8AC3E}">
+        <p14:creationId xmlns:p14="http://schemas.microsoft.com/office/powerpoint/2010/main" val="930641467"/>
+      </p:ext>
+    </p:extLst>
+  </p:cSld>
+  <p:clrMapOvr>
+    <a:masterClrMapping/>
+  </p:clrMapOvr>
+</p:notes>
+</file>
+
+<file path=ppt/notesSlides/notesSlide8.xml><?xml version="1.0" encoding="utf-8"?>
+<p:notes xmlns:a="http://schemas.openxmlformats.org/drawingml/2006/main" xmlns:r="http://schemas.openxmlformats.org/officeDocument/2006/relationships" xmlns:p="http://schemas.openxmlformats.org/presentationml/2006/main">
+  <p:cSld>
+    <p:spTree>
+      <p:nvGrpSpPr>
+        <p:cNvPr id="1" name=""/>
+        <p:cNvGrpSpPr/>
+        <p:nvPr/>
+      </p:nvGrpSpPr>
+      <p:grpSpPr>
+        <a:xfrm>
+          <a:off x="0" y="0"/>
+          <a:ext cx="0" cy="0"/>
+          <a:chOff x="0" y="0"/>
+          <a:chExt cx="0" cy="0"/>
+        </a:xfrm>
+      </p:grpSpPr>
+      <p:sp>
+        <p:nvSpPr>
+          <p:cNvPr id="2" name="Slide Image Placeholder 1"/>
+          <p:cNvSpPr>
+            <a:spLocks noGrp="1" noRot="1" noChangeAspect="1"/>
+          </p:cNvSpPr>
+          <p:nvPr>
+            <p:ph type="sldImg"/>
+          </p:nvPr>
+        </p:nvSpPr>
+        <p:spPr/>
+      </p:sp>
+      <p:sp>
+        <p:nvSpPr>
+          <p:cNvPr id="3" name="Notes Placeholder 2"/>
+          <p:cNvSpPr>
+            <a:spLocks noGrp="1"/>
+          </p:cNvSpPr>
+          <p:nvPr>
+            <p:ph type="body" idx="1"/>
+          </p:nvPr>
+        </p:nvSpPr>
+        <p:spPr/>
+        <p:txBody>
+          <a:bodyPr/>
+          <a:lstStyle/>
+          <a:p>
+            <a:pPr marL="0" indent="0">
+              <a:buFont typeface="Arial" panose="020B0604020202020204" pitchFamily="34" charset="0"/>
+              <a:buNone/>
+            </a:pPr>
+            <a:r>
+              <a:rPr lang="en-US" altLang="zh-Hans" dirty="0"/>
+              <a:t>Why</a:t>
+            </a:r>
+            <a:r>
+              <a:rPr lang="zh-Hans" altLang="en-US"/>
+              <a:t> </a:t>
+            </a:r>
+            <a:r>
+              <a:rPr lang="en-US" altLang="zh-Hans" dirty="0"/>
+              <a:t>2015?</a:t>
+            </a:r>
+            <a:r>
+              <a:rPr lang="zh-Hans" altLang="en-US"/>
+              <a:t> </a:t>
+            </a:r>
+            <a:r>
+              <a:rPr lang="en-US" altLang="zh-Hans" dirty="0"/>
+              <a:t>Because</a:t>
+            </a:r>
+            <a:r>
+              <a:rPr lang="zh-Hans" altLang="en-US"/>
+              <a:t> </a:t>
+            </a:r>
+            <a:r>
+              <a:rPr lang="en-US" altLang="zh-Hans" dirty="0"/>
+              <a:t>2015</a:t>
+            </a:r>
+            <a:r>
+              <a:rPr lang="zh-Hans" altLang="en-US"/>
+              <a:t> </a:t>
+            </a:r>
+            <a:r>
+              <a:rPr lang="en-US" altLang="zh-Hans" dirty="0"/>
+              <a:t>has</a:t>
+            </a:r>
+            <a:r>
+              <a:rPr lang="zh-Hans" altLang="en-US"/>
+              <a:t> </a:t>
+            </a:r>
+            <a:r>
+              <a:rPr lang="en-US" altLang="zh-Hans" dirty="0"/>
+              <a:t>the</a:t>
+            </a:r>
+            <a:r>
+              <a:rPr lang="zh-Hans" altLang="en-US"/>
+              <a:t> </a:t>
+            </a:r>
+            <a:r>
+              <a:rPr lang="en-US" altLang="zh-Hans" dirty="0"/>
+              <a:t>lowest</a:t>
+            </a:r>
+            <a:r>
+              <a:rPr lang="zh-Hans" altLang="en-US"/>
+              <a:t> </a:t>
+            </a:r>
+            <a:r>
+              <a:rPr lang="en-US" altLang="zh-Hans" dirty="0"/>
+              <a:t>flu</a:t>
+            </a:r>
+            <a:r>
+              <a:rPr lang="zh-Hans" altLang="en-US"/>
+              <a:t> </a:t>
+            </a:r>
+            <a:r>
+              <a:rPr lang="en-US" altLang="zh-Hans" dirty="0"/>
+              <a:t>cases</a:t>
+            </a:r>
+            <a:r>
+              <a:rPr lang="zh-Hans" altLang="en-US"/>
+              <a:t> </a:t>
+            </a:r>
+            <a:r>
+              <a:rPr lang="en-US" altLang="zh-Hans" dirty="0"/>
+              <a:t>in</a:t>
+            </a:r>
+            <a:r>
+              <a:rPr lang="zh-Hans" altLang="en-US"/>
+              <a:t> </a:t>
+            </a:r>
+            <a:r>
+              <a:rPr lang="en-US" altLang="zh-Hans" dirty="0"/>
+              <a:t>past</a:t>
+            </a:r>
+            <a:r>
+              <a:rPr lang="zh-Hans" altLang="en-US"/>
+              <a:t> </a:t>
+            </a:r>
+            <a:r>
+              <a:rPr lang="en-US" altLang="zh-Hans" dirty="0"/>
+              <a:t>5</a:t>
+            </a:r>
+            <a:r>
+              <a:rPr lang="zh-Hans" altLang="en-US"/>
+              <a:t> </a:t>
+            </a:r>
+            <a:r>
+              <a:rPr lang="en-US" altLang="zh-Hans" dirty="0"/>
+              <a:t>years.</a:t>
+            </a:r>
+            <a:endParaRPr lang="en-US" dirty="0"/>
+          </a:p>
+        </p:txBody>
+      </p:sp>
+      <p:sp>
+        <p:nvSpPr>
+          <p:cNvPr id="4" name="Slide Number Placeholder 3"/>
+          <p:cNvSpPr>
+            <a:spLocks noGrp="1"/>
+          </p:cNvSpPr>
+          <p:nvPr>
+            <p:ph type="sldNum" sz="quarter" idx="10"/>
+          </p:nvPr>
+        </p:nvSpPr>
+        <p:spPr/>
+        <p:txBody>
+          <a:bodyPr/>
+          <a:lstStyle/>
+          <a:p>
+            <a:fld id="{5974CB7E-A0D7-4E08-8BDF-ED524DDFD5CC}" type="slidenum">
+              <a:rPr lang="en-US" smtClean="0"/>
+              <a:t>8</a:t>
+            </a:fld>
+            <a:endParaRPr lang="en-US" dirty="0"/>
+          </a:p>
+        </p:txBody>
+      </p:sp>
+    </p:spTree>
+    <p:extLst>
+      <p:ext uri="{BB962C8B-B14F-4D97-AF65-F5344CB8AC3E}">
+        <p14:creationId xmlns:p14="http://schemas.microsoft.com/office/powerpoint/2010/main" val="3216539580"/>
+      </p:ext>
+    </p:extLst>
+  </p:cSld>
+  <p:clrMapOvr>
+    <a:masterClrMapping/>
+  </p:clrMapOvr>
+</p:notes>
+</file>
+
+<file path=ppt/notesSlides/notesSlide9.xml><?xml version="1.0" encoding="utf-8"?>
+<p:notes xmlns:a="http://schemas.openxmlformats.org/drawingml/2006/main" xmlns:r="http://schemas.openxmlformats.org/officeDocument/2006/relationships" xmlns:p="http://schemas.openxmlformats.org/presentationml/2006/main">
+  <p:cSld>
+    <p:spTree>
+      <p:nvGrpSpPr>
+        <p:cNvPr id="1" name=""/>
+        <p:cNvGrpSpPr/>
+        <p:nvPr/>
+      </p:nvGrpSpPr>
+      <p:grpSpPr>
+        <a:xfrm>
+          <a:off x="0" y="0"/>
+          <a:ext cx="0" cy="0"/>
+          <a:chOff x="0" y="0"/>
+          <a:chExt cx="0" cy="0"/>
+        </a:xfrm>
+      </p:grpSpPr>
+      <p:sp>
+        <p:nvSpPr>
+          <p:cNvPr id="2" name="Slide Image Placeholder 1"/>
+          <p:cNvSpPr>
+            <a:spLocks noGrp="1" noRot="1" noChangeAspect="1"/>
+          </p:cNvSpPr>
+          <p:nvPr>
+            <p:ph type="sldImg"/>
+          </p:nvPr>
+        </p:nvSpPr>
+        <p:spPr/>
+      </p:sp>
+      <p:sp>
+        <p:nvSpPr>
+          <p:cNvPr id="3" name="Notes Placeholder 2"/>
+          <p:cNvSpPr>
+            <a:spLocks noGrp="1"/>
+          </p:cNvSpPr>
+          <p:nvPr>
+            <p:ph type="body" idx="1"/>
+          </p:nvPr>
+        </p:nvSpPr>
+        <p:spPr/>
+        <p:txBody>
+          <a:bodyPr/>
+          <a:lstStyle/>
+          <a:p>
+            <a:r>
+              <a:rPr lang="en-US" dirty="0"/>
+              <a:t>Initial proposal: higher vaccination rate will lead to lower influenza rate.</a:t>
+            </a:r>
+          </a:p>
+          <a:p>
+            <a:endParaRPr lang="en-US" dirty="0"/>
+          </a:p>
+          <a:p>
+            <a:r>
+              <a:rPr lang="en-US" dirty="0"/>
+              <a:t>Result: generally true in most of the 50 states (can tell by color):</a:t>
+            </a:r>
+          </a:p>
+          <a:p>
+            <a:pPr marL="171450" indent="-171450">
+              <a:buFont typeface="Arial" panose="020B0604020202020204" pitchFamily="34" charset="0"/>
+              <a:buChar char="•"/>
+            </a:pPr>
+            <a:r>
+              <a:rPr lang="en-US" dirty="0"/>
+              <a:t>Louisiana, Mississippi, new Mexico: low vaccination rate and high flu rate</a:t>
+            </a:r>
+          </a:p>
+          <a:p>
+            <a:pPr marL="628650" lvl="1" indent="-171450">
+              <a:buFont typeface="Arial" panose="020B0604020202020204" pitchFamily="34" charset="0"/>
+              <a:buChar char="•"/>
+            </a:pPr>
+            <a:r>
+              <a:rPr lang="en-US" dirty="0"/>
+              <a:t>Possible reason: educational level, cultural background leads to different belief.</a:t>
+            </a:r>
+          </a:p>
+          <a:p>
+            <a:pPr marL="171450" indent="-171450">
+              <a:buFont typeface="Arial" panose="020B0604020202020204" pitchFamily="34" charset="0"/>
+              <a:buChar char="•"/>
+            </a:pPr>
+            <a:r>
+              <a:rPr lang="en-US" dirty="0"/>
+              <a:t>Wisconsin, Iowa, Minnesota: high vaccination rate and low flu rate</a:t>
+            </a:r>
+          </a:p>
+          <a:p>
+            <a:pPr marL="0" indent="0">
+              <a:buFont typeface="Arial" panose="020B0604020202020204" pitchFamily="34" charset="0"/>
+              <a:buNone/>
+            </a:pPr>
+            <a:endParaRPr lang="en-US" dirty="0"/>
+          </a:p>
+          <a:p>
+            <a:pPr marL="0" indent="0">
+              <a:buFont typeface="Arial" panose="020B0604020202020204" pitchFamily="34" charset="0"/>
+              <a:buNone/>
+            </a:pPr>
+            <a:endParaRPr lang="en-US" dirty="0"/>
+          </a:p>
+          <a:p>
+            <a:pPr marL="0" indent="0">
+              <a:buFont typeface="Arial" panose="020B0604020202020204" pitchFamily="34" charset="0"/>
+              <a:buNone/>
+            </a:pPr>
+            <a:endParaRPr lang="en-US" dirty="0"/>
+          </a:p>
+        </p:txBody>
+      </p:sp>
+      <p:sp>
+        <p:nvSpPr>
+          <p:cNvPr id="4" name="Slide Number Placeholder 3"/>
+          <p:cNvSpPr>
+            <a:spLocks noGrp="1"/>
+          </p:cNvSpPr>
+          <p:nvPr>
+            <p:ph type="sldNum" sz="quarter" idx="10"/>
+          </p:nvPr>
+        </p:nvSpPr>
+        <p:spPr/>
+        <p:txBody>
+          <a:bodyPr/>
+          <a:lstStyle/>
+          <a:p>
+            <a:fld id="{5974CB7E-A0D7-4E08-8BDF-ED524DDFD5CC}" type="slidenum">
+              <a:rPr lang="en-US" smtClean="0"/>
+              <a:t>9</a:t>
+            </a:fld>
+            <a:endParaRPr lang="en-US" dirty="0"/>
+          </a:p>
+        </p:txBody>
+      </p:sp>
+    </p:spTree>
+    <p:extLst>
+      <p:ext uri="{BB962C8B-B14F-4D97-AF65-F5344CB8AC3E}">
+        <p14:creationId xmlns:p14="http://schemas.microsoft.com/office/powerpoint/2010/main" val="3071717373"/>
       </p:ext>
     </p:extLst>
   </p:cSld>
@@ -1213,7 +1860,7 @@
           <a:p>
             <a:fld id="{63937D59-5EDB-4C39-B697-625748F703B6}" type="datetimeFigureOut">
               <a:rPr lang="en-US" smtClean="0"/>
-              <a:t>4/2/18</a:t>
+              <a:t>4/2/2018</a:t>
             </a:fld>
             <a:endParaRPr lang="en-US" dirty="0"/>
           </a:p>
@@ -1488,7 +2135,7 @@
           <a:p>
             <a:fld id="{63937D59-5EDB-4C39-B697-625748F703B6}" type="datetimeFigureOut">
               <a:rPr lang="en-US" smtClean="0"/>
-              <a:t>4/2/18</a:t>
+              <a:t>4/2/2018</a:t>
             </a:fld>
             <a:endParaRPr lang="en-US" dirty="0"/>
           </a:p>
@@ -1740,7 +2387,7 @@
           <a:p>
             <a:fld id="{63937D59-5EDB-4C39-B697-625748F703B6}" type="datetimeFigureOut">
               <a:rPr lang="en-US" smtClean="0"/>
-              <a:t>4/2/18</a:t>
+              <a:t>4/2/2018</a:t>
             </a:fld>
             <a:endParaRPr lang="en-US" dirty="0"/>
           </a:p>
@@ -1908,7 +2555,7 @@
           <a:p>
             <a:fld id="{63937D59-5EDB-4C39-B697-625748F703B6}" type="datetimeFigureOut">
               <a:rPr lang="en-US" smtClean="0"/>
-              <a:t>4/2/18</a:t>
+              <a:t>4/2/2018</a:t>
             </a:fld>
             <a:endParaRPr lang="en-US" dirty="0"/>
           </a:p>
@@ -2086,7 +2733,7 @@
           <a:p>
             <a:fld id="{63937D59-5EDB-4C39-B697-625748F703B6}" type="datetimeFigureOut">
               <a:rPr lang="en-US" smtClean="0"/>
-              <a:t>4/2/18</a:t>
+              <a:t>4/2/2018</a:t>
             </a:fld>
             <a:endParaRPr lang="en-US" dirty="0"/>
           </a:p>
@@ -2682,7 +3329,7 @@
           <a:p>
             <a:fld id="{63937D59-5EDB-4C39-B697-625748F703B6}" type="datetimeFigureOut">
               <a:rPr lang="en-US" smtClean="0"/>
-              <a:t>4/2/18</a:t>
+              <a:t>4/2/2018</a:t>
             </a:fld>
             <a:endParaRPr lang="en-US" dirty="0"/>
           </a:p>
@@ -2850,7 +3497,7 @@
           <a:p>
             <a:fld id="{63937D59-5EDB-4C39-B697-625748F703B6}" type="datetimeFigureOut">
               <a:rPr lang="en-US" smtClean="0"/>
-              <a:t>4/2/18</a:t>
+              <a:t>4/2/2018</a:t>
             </a:fld>
             <a:endParaRPr lang="en-US" dirty="0"/>
           </a:p>
@@ -3095,7 +3742,7 @@
           <a:p>
             <a:fld id="{63937D59-5EDB-4C39-B697-625748F703B6}" type="datetimeFigureOut">
               <a:rPr lang="en-US" smtClean="0"/>
-              <a:t>4/2/18</a:t>
+              <a:t>4/2/2018</a:t>
             </a:fld>
             <a:endParaRPr lang="en-US" dirty="0"/>
           </a:p>
@@ -3380,7 +4027,7 @@
           <a:p>
             <a:fld id="{63937D59-5EDB-4C39-B697-625748F703B6}" type="datetimeFigureOut">
               <a:rPr lang="en-US" smtClean="0"/>
-              <a:t>4/2/18</a:t>
+              <a:t>4/2/2018</a:t>
             </a:fld>
             <a:endParaRPr lang="en-US" dirty="0"/>
           </a:p>
@@ -3799,7 +4446,7 @@
           <a:p>
             <a:fld id="{63937D59-5EDB-4C39-B697-625748F703B6}" type="datetimeFigureOut">
               <a:rPr lang="en-US" smtClean="0"/>
-              <a:t>4/2/18</a:t>
+              <a:t>4/2/2018</a:t>
             </a:fld>
             <a:endParaRPr lang="en-US" dirty="0"/>
           </a:p>
@@ -3916,7 +4563,7 @@
           <a:p>
             <a:fld id="{63937D59-5EDB-4C39-B697-625748F703B6}" type="datetimeFigureOut">
               <a:rPr lang="en-US" smtClean="0"/>
-              <a:t>4/2/18</a:t>
+              <a:t>4/2/2018</a:t>
             </a:fld>
             <a:endParaRPr lang="en-US" dirty="0"/>
           </a:p>
@@ -4418,7 +5065,7 @@
           <a:p>
             <a:fld id="{63937D59-5EDB-4C39-B697-625748F703B6}" type="datetimeFigureOut">
               <a:rPr lang="en-US" smtClean="0"/>
-              <a:t>4/2/18</a:t>
+              <a:t>4/2/2018</a:t>
             </a:fld>
             <a:endParaRPr lang="en-US" dirty="0"/>
           </a:p>
@@ -7042,7 +7689,7 @@
           <p:nvPr/>
         </p:nvPicPr>
         <p:blipFill>
-          <a:blip r:embed="rId2">
+          <a:blip r:embed="rId3" cstate="print">
             <a:extLst>
               <a:ext uri="{28A0092B-C50C-407E-A947-70E740481C1C}">
                 <a14:useLocalDpi xmlns:a14="http://schemas.microsoft.com/office/drawing/2010/main" val="0"/>
@@ -7419,7 +8066,7 @@
           <p:nvPr/>
         </p:nvPicPr>
         <p:blipFill>
-          <a:blip r:embed="rId2"/>
+          <a:blip r:embed="rId3"/>
           <a:stretch>
             <a:fillRect/>
           </a:stretch>
@@ -8424,7 +9071,7 @@
           <p:nvPr/>
         </p:nvPicPr>
         <p:blipFill>
-          <a:blip r:embed="rId3">
+          <a:blip r:embed="rId3" cstate="print">
             <a:extLst>
               <a:ext uri="{28A0092B-C50C-407E-A947-70E740481C1C}">
                 <a14:useLocalDpi xmlns:a14="http://schemas.microsoft.com/office/drawing/2010/main" val="0"/>
@@ -8785,7 +9432,7 @@
           <p:nvPr/>
         </p:nvPicPr>
         <p:blipFill>
-          <a:blip r:embed="rId2">
+          <a:blip r:embed="rId3" cstate="print">
             <a:extLst>
               <a:ext uri="{28A0092B-C50C-407E-A947-70E740481C1C}">
                 <a14:useLocalDpi xmlns:a14="http://schemas.microsoft.com/office/drawing/2010/main" val="0"/>
@@ -8821,7 +9468,7 @@
           <p:nvPr/>
         </p:nvPicPr>
         <p:blipFill>
-          <a:blip r:embed="rId3">
+          <a:blip r:embed="rId4" cstate="print">
             <a:extLst>
               <a:ext uri="{28A0092B-C50C-407E-A947-70E740481C1C}">
                 <a14:useLocalDpi xmlns:a14="http://schemas.microsoft.com/office/drawing/2010/main" val="0"/>
@@ -8857,7 +9504,7 @@
           <p:nvPr/>
         </p:nvPicPr>
         <p:blipFill>
-          <a:blip r:embed="rId4">
+          <a:blip r:embed="rId5" cstate="print">
             <a:extLst>
               <a:ext uri="{28A0092B-C50C-407E-A947-70E740481C1C}">
                 <a14:useLocalDpi xmlns:a14="http://schemas.microsoft.com/office/drawing/2010/main" val="0"/>
@@ -8893,7 +9540,7 @@
           <p:nvPr/>
         </p:nvPicPr>
         <p:blipFill>
-          <a:blip r:embed="rId5">
+          <a:blip r:embed="rId6" cstate="print">
             <a:extLst>
               <a:ext uri="{28A0092B-C50C-407E-A947-70E740481C1C}">
                 <a14:useLocalDpi xmlns:a14="http://schemas.microsoft.com/office/drawing/2010/main" val="0"/>
@@ -9389,7 +10036,7 @@
           <p:nvPr/>
         </p:nvPicPr>
         <p:blipFill>
-          <a:blip r:embed="rId3">
+          <a:blip r:embed="rId3" cstate="print">
             <a:extLst>
               <a:ext uri="{28A0092B-C50C-407E-A947-70E740481C1C}">
                 <a14:useLocalDpi xmlns:a14="http://schemas.microsoft.com/office/drawing/2010/main" val="0"/>
@@ -9425,7 +10072,7 @@
           <p:nvPr/>
         </p:nvPicPr>
         <p:blipFill>
-          <a:blip r:embed="rId4">
+          <a:blip r:embed="rId4" cstate="print">
             <a:extLst>
               <a:ext uri="{28A0092B-C50C-407E-A947-70E740481C1C}">
                 <a14:useLocalDpi xmlns:a14="http://schemas.microsoft.com/office/drawing/2010/main" val="0"/>

</xml_diff>

<commit_message>
Repaired word wrapping that split words between lines.
</commit_message>
<xml_diff>
--- a/presentation/analyticus_Influenza_vs._vaccinations.pptx
+++ b/presentation/analyticus_Influenza_vs._vaccinations.pptx
@@ -133,6 +133,9 @@
           </p15:clr>
         </p15:guide>
       </p15:sldGuideLst>
+    </p:ext>
+    <p:ext uri="{2D200454-40CA-4A62-9FC3-DE9A4176ACB9}">
+      <p15:notesGuideLst xmlns:p15="http://schemas.microsoft.com/office/powerpoint/2012/main"/>
     </p:ext>
   </p:extLst>
 </p:presentation>
@@ -7913,7 +7916,7 @@
         <p:spPr>
           <a:xfrm>
             <a:off x="827584" y="1203598"/>
-            <a:ext cx="5760640" cy="1699593"/>
+            <a:ext cx="5832648" cy="1699593"/>
           </a:xfrm>
         </p:spPr>
         <p:txBody>
@@ -7926,7 +7929,14 @@
             </a:r>
             <a:r>
               <a:rPr lang="en-US" sz="2000" dirty="0"/>
-              <a:t>  During the recent flu season, the effectiveness of the vaccine was questioned.</a:t>
+              <a:t>  During the recent flu season, the </a:t>
+            </a:r>
+            <a:br>
+              <a:rPr lang="en-US" sz="2000" dirty="0"/>
+            </a:br>
+            <a:r>
+              <a:rPr lang="en-US" sz="2000" dirty="0"/>
+              <a:t>effectiveness of the vaccine was questioned.</a:t>
             </a:r>
           </a:p>
           <a:p>
@@ -7952,7 +7962,28 @@
             </a:r>
             <a:r>
               <a:rPr lang="en-US" sz="2000" dirty="0"/>
-              <a:t>  Compare vaccination rates from Health and Human Services (HHS) and compare them to the rates of influenza from the Center of Disease Control (CDC)</a:t>
+              <a:t>  Compare vaccination rates from Health </a:t>
+            </a:r>
+            <a:br>
+              <a:rPr lang="en-US" sz="2000" dirty="0"/>
+            </a:br>
+            <a:r>
+              <a:rPr lang="en-US" sz="2000" dirty="0"/>
+              <a:t>and Human Services (HHS) and compare them </a:t>
+            </a:r>
+            <a:br>
+              <a:rPr lang="en-US" sz="2000" dirty="0"/>
+            </a:br>
+            <a:r>
+              <a:rPr lang="en-US" sz="2000" dirty="0"/>
+              <a:t>to the rates of influenza from the Center of </a:t>
+            </a:r>
+            <a:br>
+              <a:rPr lang="en-US" sz="2000" dirty="0"/>
+            </a:br>
+            <a:r>
+              <a:rPr lang="en-US" sz="2000" dirty="0"/>
+              <a:t>Disease Control (CDC)</a:t>
             </a:r>
           </a:p>
           <a:p>
@@ -10366,7 +10397,38 @@
                   <a:schemeClr val="tx2"/>
                 </a:solidFill>
               </a:rPr>
-              <a:t>Generally, states higher vaccination rate would have lower influenza rate.</a:t>
+              <a:t>Generally, states higher vaccination rate would have lower </a:t>
+            </a:r>
+            <a:r>
+              <a:rPr lang="en-US">
+                <a:solidFill>
+                  <a:schemeClr val="tx2"/>
+                </a:solidFill>
+              </a:rPr>
+              <a:t>influenza </a:t>
+            </a:r>
+            <a:br>
+              <a:rPr lang="en-US">
+                <a:solidFill>
+                  <a:schemeClr val="tx2"/>
+                </a:solidFill>
+              </a:rPr>
+            </a:br>
+            <a:r>
+              <a:rPr lang="en-US">
+                <a:solidFill>
+                  <a:schemeClr val="tx2"/>
+                </a:solidFill>
+              </a:rPr>
+              <a:t>rate</a:t>
+            </a:r>
+            <a:r>
+              <a:rPr lang="en-US" dirty="0">
+                <a:solidFill>
+                  <a:schemeClr val="tx2"/>
+                </a:solidFill>
+              </a:rPr>
+              <a:t>.</a:t>
             </a:r>
           </a:p>
         </p:txBody>

</xml_diff>

<commit_message>
2015 vs 2017 change
</commit_message>
<xml_diff>
--- a/presentation/analyticus_Influenza_vs._vaccinations.pptx
+++ b/presentation/analyticus_Influenza_vs._vaccinations.pptx
@@ -235,7 +235,7 @@
           <a:p>
             <a:fld id="{43EFFB48-1042-473B-808E-23A5C5FAEE77}" type="datetimeFigureOut">
               <a:rPr lang="en-US" smtClean="0"/>
-              <a:t>4/2/2018</a:t>
+              <a:t>4/2/18</a:t>
             </a:fld>
             <a:endParaRPr lang="en-US" dirty="0"/>
           </a:p>
@@ -1503,7 +1503,7 @@
               <a:t>Why</a:t>
             </a:r>
             <a:r>
-              <a:rPr lang="zh-Hans" altLang="en-US"/>
+              <a:rPr lang="zh-Hans" altLang="en-US" dirty="0"/>
               <a:t> </a:t>
             </a:r>
             <a:r>
@@ -1511,7 +1511,7 @@
               <a:t>2015?</a:t>
             </a:r>
             <a:r>
-              <a:rPr lang="zh-Hans" altLang="en-US"/>
+              <a:rPr lang="zh-Hans" altLang="en-US" dirty="0"/>
               <a:t> </a:t>
             </a:r>
             <a:r>
@@ -1519,7 +1519,7 @@
               <a:t>Because</a:t>
             </a:r>
             <a:r>
-              <a:rPr lang="zh-Hans" altLang="en-US"/>
+              <a:rPr lang="zh-Hans" altLang="en-US" dirty="0"/>
               <a:t> </a:t>
             </a:r>
             <a:r>
@@ -1527,7 +1527,7 @@
               <a:t>2015</a:t>
             </a:r>
             <a:r>
-              <a:rPr lang="zh-Hans" altLang="en-US"/>
+              <a:rPr lang="zh-Hans" altLang="en-US" dirty="0"/>
               <a:t> </a:t>
             </a:r>
             <a:r>
@@ -1535,7 +1535,7 @@
               <a:t>has</a:t>
             </a:r>
             <a:r>
-              <a:rPr lang="zh-Hans" altLang="en-US"/>
+              <a:rPr lang="zh-Hans" altLang="en-US" dirty="0"/>
               <a:t> </a:t>
             </a:r>
             <a:r>
@@ -1543,7 +1543,7 @@
               <a:t>the</a:t>
             </a:r>
             <a:r>
-              <a:rPr lang="zh-Hans" altLang="en-US"/>
+              <a:rPr lang="zh-Hans" altLang="en-US" dirty="0"/>
               <a:t> </a:t>
             </a:r>
             <a:r>
@@ -1551,7 +1551,7 @@
               <a:t>lowest</a:t>
             </a:r>
             <a:r>
-              <a:rPr lang="zh-Hans" altLang="en-US"/>
+              <a:rPr lang="zh-Hans" altLang="en-US" dirty="0"/>
               <a:t> </a:t>
             </a:r>
             <a:r>
@@ -1559,7 +1559,7 @@
               <a:t>flu</a:t>
             </a:r>
             <a:r>
-              <a:rPr lang="zh-Hans" altLang="en-US"/>
+              <a:rPr lang="zh-Hans" altLang="en-US" dirty="0"/>
               <a:t> </a:t>
             </a:r>
             <a:r>
@@ -1567,7 +1567,7 @@
               <a:t>cases</a:t>
             </a:r>
             <a:r>
-              <a:rPr lang="zh-Hans" altLang="en-US"/>
+              <a:rPr lang="zh-Hans" altLang="en-US" dirty="0"/>
               <a:t> </a:t>
             </a:r>
             <a:r>
@@ -1575,7 +1575,7 @@
               <a:t>in</a:t>
             </a:r>
             <a:r>
-              <a:rPr lang="zh-Hans" altLang="en-US"/>
+              <a:rPr lang="zh-Hans" altLang="en-US" dirty="0"/>
               <a:t> </a:t>
             </a:r>
             <a:r>
@@ -1583,7 +1583,7 @@
               <a:t>past</a:t>
             </a:r>
             <a:r>
-              <a:rPr lang="zh-Hans" altLang="en-US"/>
+              <a:rPr lang="zh-Hans" altLang="en-US" dirty="0"/>
               <a:t> </a:t>
             </a:r>
             <a:r>
@@ -1591,7 +1591,7 @@
               <a:t>5</a:t>
             </a:r>
             <a:r>
-              <a:rPr lang="zh-Hans" altLang="en-US"/>
+              <a:rPr lang="zh-Hans" altLang="en-US" dirty="0"/>
               <a:t> </a:t>
             </a:r>
             <a:r>
@@ -1863,7 +1863,7 @@
           <a:p>
             <a:fld id="{63937D59-5EDB-4C39-B697-625748F703B6}" type="datetimeFigureOut">
               <a:rPr lang="en-US" smtClean="0"/>
-              <a:t>4/2/2018</a:t>
+              <a:t>4/2/18</a:t>
             </a:fld>
             <a:endParaRPr lang="en-US" dirty="0"/>
           </a:p>
@@ -2138,7 +2138,7 @@
           <a:p>
             <a:fld id="{63937D59-5EDB-4C39-B697-625748F703B6}" type="datetimeFigureOut">
               <a:rPr lang="en-US" smtClean="0"/>
-              <a:t>4/2/2018</a:t>
+              <a:t>4/2/18</a:t>
             </a:fld>
             <a:endParaRPr lang="en-US" dirty="0"/>
           </a:p>
@@ -2390,7 +2390,7 @@
           <a:p>
             <a:fld id="{63937D59-5EDB-4C39-B697-625748F703B6}" type="datetimeFigureOut">
               <a:rPr lang="en-US" smtClean="0"/>
-              <a:t>4/2/2018</a:t>
+              <a:t>4/2/18</a:t>
             </a:fld>
             <a:endParaRPr lang="en-US" dirty="0"/>
           </a:p>
@@ -2558,7 +2558,7 @@
           <a:p>
             <a:fld id="{63937D59-5EDB-4C39-B697-625748F703B6}" type="datetimeFigureOut">
               <a:rPr lang="en-US" smtClean="0"/>
-              <a:t>4/2/2018</a:t>
+              <a:t>4/2/18</a:t>
             </a:fld>
             <a:endParaRPr lang="en-US" dirty="0"/>
           </a:p>
@@ -2736,7 +2736,7 @@
           <a:p>
             <a:fld id="{63937D59-5EDB-4C39-B697-625748F703B6}" type="datetimeFigureOut">
               <a:rPr lang="en-US" smtClean="0"/>
-              <a:t>4/2/2018</a:t>
+              <a:t>4/2/18</a:t>
             </a:fld>
             <a:endParaRPr lang="en-US" dirty="0"/>
           </a:p>
@@ -3332,7 +3332,7 @@
           <a:p>
             <a:fld id="{63937D59-5EDB-4C39-B697-625748F703B6}" type="datetimeFigureOut">
               <a:rPr lang="en-US" smtClean="0"/>
-              <a:t>4/2/2018</a:t>
+              <a:t>4/2/18</a:t>
             </a:fld>
             <a:endParaRPr lang="en-US" dirty="0"/>
           </a:p>
@@ -3500,7 +3500,7 @@
           <a:p>
             <a:fld id="{63937D59-5EDB-4C39-B697-625748F703B6}" type="datetimeFigureOut">
               <a:rPr lang="en-US" smtClean="0"/>
-              <a:t>4/2/2018</a:t>
+              <a:t>4/2/18</a:t>
             </a:fld>
             <a:endParaRPr lang="en-US" dirty="0"/>
           </a:p>
@@ -3745,7 +3745,7 @@
           <a:p>
             <a:fld id="{63937D59-5EDB-4C39-B697-625748F703B6}" type="datetimeFigureOut">
               <a:rPr lang="en-US" smtClean="0"/>
-              <a:t>4/2/2018</a:t>
+              <a:t>4/2/18</a:t>
             </a:fld>
             <a:endParaRPr lang="en-US" dirty="0"/>
           </a:p>
@@ -4030,7 +4030,7 @@
           <a:p>
             <a:fld id="{63937D59-5EDB-4C39-B697-625748F703B6}" type="datetimeFigureOut">
               <a:rPr lang="en-US" smtClean="0"/>
-              <a:t>4/2/2018</a:t>
+              <a:t>4/2/18</a:t>
             </a:fld>
             <a:endParaRPr lang="en-US" dirty="0"/>
           </a:p>
@@ -4449,7 +4449,7 @@
           <a:p>
             <a:fld id="{63937D59-5EDB-4C39-B697-625748F703B6}" type="datetimeFigureOut">
               <a:rPr lang="en-US" smtClean="0"/>
-              <a:t>4/2/2018</a:t>
+              <a:t>4/2/18</a:t>
             </a:fld>
             <a:endParaRPr lang="en-US" dirty="0"/>
           </a:p>
@@ -4566,7 +4566,7 @@
           <a:p>
             <a:fld id="{63937D59-5EDB-4C39-B697-625748F703B6}" type="datetimeFigureOut">
               <a:rPr lang="en-US" smtClean="0"/>
-              <a:t>4/2/2018</a:t>
+              <a:t>4/2/18</a:t>
             </a:fld>
             <a:endParaRPr lang="en-US" dirty="0"/>
           </a:p>
@@ -5068,7 +5068,7 @@
           <a:p>
             <a:fld id="{63937D59-5EDB-4C39-B697-625748F703B6}" type="datetimeFigureOut">
               <a:rPr lang="en-US" smtClean="0"/>
-              <a:t>4/2/2018</a:t>
+              <a:t>4/2/18</a:t>
             </a:fld>
             <a:endParaRPr lang="en-US" dirty="0"/>
           </a:p>
@@ -9804,7 +9804,7 @@
         <p:spPr>
           <a:xfrm>
             <a:off x="5812755" y="3091252"/>
-            <a:ext cx="2885605" cy="1224136"/>
+            <a:ext cx="2935709" cy="1568730"/>
           </a:xfrm>
           <a:prstGeom prst="roundRect">
             <a:avLst/>
@@ -9845,7 +9845,7 @@
               <a:t>2017</a:t>
             </a:r>
             <a:r>
-              <a:rPr lang="zh-Hans" altLang="en-US">
+              <a:rPr lang="zh-Hans" altLang="en-US" dirty="0">
                 <a:solidFill>
                   <a:schemeClr val="tx2"/>
                 </a:solidFill>
@@ -9861,7 +9861,7 @@
               <a:t>is</a:t>
             </a:r>
             <a:r>
-              <a:rPr lang="zh-Hans" altLang="en-US">
+              <a:rPr lang="zh-Hans" altLang="en-US" dirty="0">
                 <a:solidFill>
                   <a:schemeClr val="tx2"/>
                 </a:solidFill>
@@ -9877,7 +9877,7 @@
               <a:t>the</a:t>
             </a:r>
             <a:r>
-              <a:rPr lang="zh-Hans" altLang="en-US">
+              <a:rPr lang="zh-Hans" altLang="en-US" dirty="0">
                 <a:solidFill>
                   <a:schemeClr val="tx2"/>
                 </a:solidFill>
@@ -9893,7 +9893,7 @@
               <a:t>first</a:t>
             </a:r>
             <a:r>
-              <a:rPr lang="zh-Hans" altLang="en-US">
+              <a:rPr lang="zh-Hans" altLang="en-US" dirty="0">
                 <a:solidFill>
                   <a:schemeClr val="tx2"/>
                 </a:solidFill>
@@ -9909,7 +9909,7 @@
               <a:t>time</a:t>
             </a:r>
             <a:r>
-              <a:rPr lang="zh-Hans" altLang="en-US">
+              <a:rPr lang="zh-Hans" altLang="en-US" dirty="0">
                 <a:solidFill>
                   <a:schemeClr val="tx2"/>
                 </a:solidFill>
@@ -9925,7 +9925,7 @@
               <a:t>the</a:t>
             </a:r>
             <a:r>
-              <a:rPr lang="zh-Hans" altLang="en-US">
+              <a:rPr lang="zh-Hans" altLang="en-US" dirty="0">
                 <a:solidFill>
                   <a:schemeClr val="tx2"/>
                 </a:solidFill>
@@ -9941,7 +9941,7 @@
               <a:t>flu</a:t>
             </a:r>
             <a:r>
-              <a:rPr lang="zh-Hans" altLang="en-US">
+              <a:rPr lang="zh-Hans" altLang="en-US" dirty="0">
                 <a:solidFill>
                   <a:schemeClr val="tx2"/>
                 </a:solidFill>
@@ -9957,7 +9957,7 @@
               <a:t>rate</a:t>
             </a:r>
             <a:r>
-              <a:rPr lang="zh-Hans" altLang="en-US">
+              <a:rPr lang="zh-Hans" altLang="en-US" dirty="0">
                 <a:solidFill>
                   <a:schemeClr val="tx2"/>
                 </a:solidFill>
@@ -9973,7 +9973,7 @@
               <a:t>higher</a:t>
             </a:r>
             <a:r>
-              <a:rPr lang="zh-Hans" altLang="en-US">
+              <a:rPr lang="zh-Hans" altLang="en-US" dirty="0">
                 <a:solidFill>
                   <a:schemeClr val="tx2"/>
                 </a:solidFill>
@@ -9989,7 +9989,7 @@
               <a:t>than</a:t>
             </a:r>
             <a:r>
-              <a:rPr lang="zh-Hans" altLang="en-US">
+              <a:rPr lang="zh-Hans" altLang="en-US" dirty="0">
                 <a:solidFill>
                   <a:schemeClr val="tx2"/>
                 </a:solidFill>
@@ -10005,7 +10005,7 @@
               <a:t>the</a:t>
             </a:r>
             <a:r>
-              <a:rPr lang="zh-Hans" altLang="en-US">
+              <a:rPr lang="zh-Hans" altLang="en-US" dirty="0">
                 <a:solidFill>
                   <a:schemeClr val="tx2"/>
                 </a:solidFill>
@@ -10021,7 +10021,7 @@
               <a:t>vaccine</a:t>
             </a:r>
             <a:r>
-              <a:rPr lang="zh-Hans" altLang="en-US">
+              <a:rPr lang="zh-Hans" altLang="en-US" dirty="0">
                 <a:solidFill>
                   <a:schemeClr val="tx2"/>
                 </a:solidFill>
@@ -10037,12 +10037,103 @@
               <a:t>rate.</a:t>
             </a:r>
             <a:r>
-              <a:rPr lang="zh-Hans" altLang="en-US">
+              <a:rPr lang="zh-Hans" altLang="en-US" dirty="0">
                 <a:solidFill>
                   <a:schemeClr val="tx2"/>
                 </a:solidFill>
               </a:rPr>
               <a:t> </a:t>
+            </a:r>
+            <a:endParaRPr lang="en-US" altLang="zh-Hans" dirty="0">
+              <a:solidFill>
+                <a:schemeClr val="tx2"/>
+              </a:solidFill>
+            </a:endParaRPr>
+          </a:p>
+          <a:p>
+            <a:pPr algn="just"/>
+            <a:r>
+              <a:rPr lang="en-US" altLang="zh-Hans" dirty="0">
+                <a:solidFill>
+                  <a:schemeClr val="tx2"/>
+                </a:solidFill>
+              </a:rPr>
+              <a:t>Higher</a:t>
+            </a:r>
+            <a:r>
+              <a:rPr lang="zh-Hans" altLang="en-US" dirty="0">
+                <a:solidFill>
+                  <a:schemeClr val="tx2"/>
+                </a:solidFill>
+              </a:rPr>
+              <a:t> </a:t>
+            </a:r>
+            <a:r>
+              <a:rPr lang="en-US" altLang="zh-Hans" dirty="0">
+                <a:solidFill>
+                  <a:schemeClr val="tx2"/>
+                </a:solidFill>
+              </a:rPr>
+              <a:t>vaccines</a:t>
+            </a:r>
+            <a:r>
+              <a:rPr lang="zh-Hans" altLang="en-US" dirty="0">
+                <a:solidFill>
+                  <a:schemeClr val="tx2"/>
+                </a:solidFill>
+              </a:rPr>
+              <a:t> </a:t>
+            </a:r>
+            <a:r>
+              <a:rPr lang="en-US" altLang="zh-Hans" dirty="0">
+                <a:solidFill>
+                  <a:schemeClr val="tx2"/>
+                </a:solidFill>
+              </a:rPr>
+              <a:t>rate,</a:t>
+            </a:r>
+          </a:p>
+          <a:p>
+            <a:pPr algn="just"/>
+            <a:r>
+              <a:rPr lang="en-US" altLang="zh-Hans" dirty="0">
+                <a:solidFill>
+                  <a:schemeClr val="tx2"/>
+                </a:solidFill>
+              </a:rPr>
+              <a:t>higher</a:t>
+            </a:r>
+            <a:r>
+              <a:rPr lang="zh-Hans" altLang="en-US" dirty="0">
+                <a:solidFill>
+                  <a:schemeClr val="tx2"/>
+                </a:solidFill>
+              </a:rPr>
+              <a:t> </a:t>
+            </a:r>
+            <a:r>
+              <a:rPr lang="en-US" altLang="zh-Hans" dirty="0">
+                <a:solidFill>
+                  <a:schemeClr val="tx2"/>
+                </a:solidFill>
+              </a:rPr>
+              <a:t>flu</a:t>
+            </a:r>
+            <a:r>
+              <a:rPr lang="zh-Hans" altLang="en-US" dirty="0">
+                <a:solidFill>
+                  <a:schemeClr val="tx2"/>
+                </a:solidFill>
+              </a:rPr>
+              <a:t> </a:t>
+            </a:r>
+            <a:r>
+              <a:rPr lang="en-US" altLang="zh-Hans" dirty="0">
+                <a:solidFill>
+                  <a:schemeClr val="tx2"/>
+                </a:solidFill>
+              </a:rPr>
+              <a:t>rate.</a:t>
             </a:r>
             <a:endParaRPr lang="en-US" dirty="0">
               <a:solidFill>

</xml_diff>